<commit_message>
Removed duplicate text box
</commit_message>
<xml_diff>
--- a/Documentation/Project Management/Firmware plan.pptx
+++ b/Documentation/Project Management/Firmware plan.pptx
@@ -105,6 +105,11 @@
       </a:defRPr>
     </a:lvl9pPr>
   </p:defaultTextStyle>
+  <p:extLst>
+    <p:ext uri="{EFAFB233-063F-42B5-8137-9DF3F51BA10A}">
+      <p15:sldGuideLst xmlns:p15="http://schemas.microsoft.com/office/powerpoint/2012/main"/>
+    </p:ext>
+  </p:extLst>
 </p:presentation>
 </file>
 
@@ -3506,227 +3511,6 @@
           </a:p>
         </p:txBody>
       </p:sp>
-      <p:sp>
-        <p:nvSpPr>
-          <p:cNvPr id="4" name="Content Placeholder 2">
-            <a:extLst>
-              <a:ext uri="{FF2B5EF4-FFF2-40B4-BE49-F238E27FC236}">
-                <a16:creationId xmlns:a16="http://schemas.microsoft.com/office/drawing/2014/main" id="{95A04A39-8629-4413-A8EC-E9085B099D35}"/>
-              </a:ext>
-            </a:extLst>
-          </p:cNvPr>
-          <p:cNvSpPr txBox="1">
-            <a:spLocks/>
-          </p:cNvSpPr>
-          <p:nvPr/>
-        </p:nvSpPr>
-        <p:spPr>
-          <a:xfrm>
-            <a:off x="838200" y="1852258"/>
-            <a:ext cx="10515600" cy="4351338"/>
-          </a:xfrm>
-          <a:prstGeom prst="rect">
-            <a:avLst/>
-          </a:prstGeom>
-        </p:spPr>
-        <p:txBody>
-          <a:bodyPr vert="horz" lIns="91440" tIns="45720" rIns="91440" bIns="45720" rtlCol="0">
-            <a:normAutofit/>
-          </a:bodyPr>
-          <a:lstStyle>
-            <a:lvl1pPr marL="228600" indent="-228600" algn="l" defTabSz="914400" rtl="0" eaLnBrk="1" latinLnBrk="0" hangingPunct="1">
-              <a:lnSpc>
-                <a:spcPct val="90000"/>
-              </a:lnSpc>
-              <a:spcBef>
-                <a:spcPts val="1000"/>
-              </a:spcBef>
-              <a:buFont typeface="Arial" panose="020B0604020202020204" pitchFamily="34" charset="0"/>
-              <a:buChar char="•"/>
-              <a:defRPr sz="2800" kern="1200">
-                <a:solidFill>
-                  <a:schemeClr val="tx1"/>
-                </a:solidFill>
-                <a:latin typeface="+mn-lt"/>
-                <a:ea typeface="+mn-ea"/>
-                <a:cs typeface="+mn-cs"/>
-              </a:defRPr>
-            </a:lvl1pPr>
-            <a:lvl2pPr marL="685800" indent="-228600" algn="l" defTabSz="914400" rtl="0" eaLnBrk="1" latinLnBrk="0" hangingPunct="1">
-              <a:lnSpc>
-                <a:spcPct val="90000"/>
-              </a:lnSpc>
-              <a:spcBef>
-                <a:spcPts val="500"/>
-              </a:spcBef>
-              <a:buFont typeface="Arial" panose="020B0604020202020204" pitchFamily="34" charset="0"/>
-              <a:buChar char="•"/>
-              <a:defRPr sz="2400" kern="1200">
-                <a:solidFill>
-                  <a:schemeClr val="tx1"/>
-                </a:solidFill>
-                <a:latin typeface="+mn-lt"/>
-                <a:ea typeface="+mn-ea"/>
-                <a:cs typeface="+mn-cs"/>
-              </a:defRPr>
-            </a:lvl2pPr>
-            <a:lvl3pPr marL="1143000" indent="-228600" algn="l" defTabSz="914400" rtl="0" eaLnBrk="1" latinLnBrk="0" hangingPunct="1">
-              <a:lnSpc>
-                <a:spcPct val="90000"/>
-              </a:lnSpc>
-              <a:spcBef>
-                <a:spcPts val="500"/>
-              </a:spcBef>
-              <a:buFont typeface="Arial" panose="020B0604020202020204" pitchFamily="34" charset="0"/>
-              <a:buChar char="•"/>
-              <a:defRPr sz="2000" kern="1200">
-                <a:solidFill>
-                  <a:schemeClr val="tx1"/>
-                </a:solidFill>
-                <a:latin typeface="+mn-lt"/>
-                <a:ea typeface="+mn-ea"/>
-                <a:cs typeface="+mn-cs"/>
-              </a:defRPr>
-            </a:lvl3pPr>
-            <a:lvl4pPr marL="1600200" indent="-228600" algn="l" defTabSz="914400" rtl="0" eaLnBrk="1" latinLnBrk="0" hangingPunct="1">
-              <a:lnSpc>
-                <a:spcPct val="90000"/>
-              </a:lnSpc>
-              <a:spcBef>
-                <a:spcPts val="500"/>
-              </a:spcBef>
-              <a:buFont typeface="Arial" panose="020B0604020202020204" pitchFamily="34" charset="0"/>
-              <a:buChar char="•"/>
-              <a:defRPr sz="1800" kern="1200">
-                <a:solidFill>
-                  <a:schemeClr val="tx1"/>
-                </a:solidFill>
-                <a:latin typeface="+mn-lt"/>
-                <a:ea typeface="+mn-ea"/>
-                <a:cs typeface="+mn-cs"/>
-              </a:defRPr>
-            </a:lvl4pPr>
-            <a:lvl5pPr marL="2057400" indent="-228600" algn="l" defTabSz="914400" rtl="0" eaLnBrk="1" latinLnBrk="0" hangingPunct="1">
-              <a:lnSpc>
-                <a:spcPct val="90000"/>
-              </a:lnSpc>
-              <a:spcBef>
-                <a:spcPts val="500"/>
-              </a:spcBef>
-              <a:buFont typeface="Arial" panose="020B0604020202020204" pitchFamily="34" charset="0"/>
-              <a:buChar char="•"/>
-              <a:defRPr sz="1800" kern="1200">
-                <a:solidFill>
-                  <a:schemeClr val="tx1"/>
-                </a:solidFill>
-                <a:latin typeface="+mn-lt"/>
-                <a:ea typeface="+mn-ea"/>
-                <a:cs typeface="+mn-cs"/>
-              </a:defRPr>
-            </a:lvl5pPr>
-            <a:lvl6pPr marL="2514600" indent="-228600" algn="l" defTabSz="914400" rtl="0" eaLnBrk="1" latinLnBrk="0" hangingPunct="1">
-              <a:lnSpc>
-                <a:spcPct val="90000"/>
-              </a:lnSpc>
-              <a:spcBef>
-                <a:spcPts val="500"/>
-              </a:spcBef>
-              <a:buFont typeface="Arial" panose="020B0604020202020204" pitchFamily="34" charset="0"/>
-              <a:buChar char="•"/>
-              <a:defRPr sz="1800" kern="1200">
-                <a:solidFill>
-                  <a:schemeClr val="tx1"/>
-                </a:solidFill>
-                <a:latin typeface="+mn-lt"/>
-                <a:ea typeface="+mn-ea"/>
-                <a:cs typeface="+mn-cs"/>
-              </a:defRPr>
-            </a:lvl6pPr>
-            <a:lvl7pPr marL="2971800" indent="-228600" algn="l" defTabSz="914400" rtl="0" eaLnBrk="1" latinLnBrk="0" hangingPunct="1">
-              <a:lnSpc>
-                <a:spcPct val="90000"/>
-              </a:lnSpc>
-              <a:spcBef>
-                <a:spcPts val="500"/>
-              </a:spcBef>
-              <a:buFont typeface="Arial" panose="020B0604020202020204" pitchFamily="34" charset="0"/>
-              <a:buChar char="•"/>
-              <a:defRPr sz="1800" kern="1200">
-                <a:solidFill>
-                  <a:schemeClr val="tx1"/>
-                </a:solidFill>
-                <a:latin typeface="+mn-lt"/>
-                <a:ea typeface="+mn-ea"/>
-                <a:cs typeface="+mn-cs"/>
-              </a:defRPr>
-            </a:lvl7pPr>
-            <a:lvl8pPr marL="3429000" indent="-228600" algn="l" defTabSz="914400" rtl="0" eaLnBrk="1" latinLnBrk="0" hangingPunct="1">
-              <a:lnSpc>
-                <a:spcPct val="90000"/>
-              </a:lnSpc>
-              <a:spcBef>
-                <a:spcPts val="500"/>
-              </a:spcBef>
-              <a:buFont typeface="Arial" panose="020B0604020202020204" pitchFamily="34" charset="0"/>
-              <a:buChar char="•"/>
-              <a:defRPr sz="1800" kern="1200">
-                <a:solidFill>
-                  <a:schemeClr val="tx1"/>
-                </a:solidFill>
-                <a:latin typeface="+mn-lt"/>
-                <a:ea typeface="+mn-ea"/>
-                <a:cs typeface="+mn-cs"/>
-              </a:defRPr>
-            </a:lvl8pPr>
-            <a:lvl9pPr marL="3886200" indent="-228600" algn="l" defTabSz="914400" rtl="0" eaLnBrk="1" latinLnBrk="0" hangingPunct="1">
-              <a:lnSpc>
-                <a:spcPct val="90000"/>
-              </a:lnSpc>
-              <a:spcBef>
-                <a:spcPts val="500"/>
-              </a:spcBef>
-              <a:buFont typeface="Arial" panose="020B0604020202020204" pitchFamily="34" charset="0"/>
-              <a:buChar char="•"/>
-              <a:defRPr sz="1800" kern="1200">
-                <a:solidFill>
-                  <a:schemeClr val="tx1"/>
-                </a:solidFill>
-                <a:latin typeface="+mn-lt"/>
-                <a:ea typeface="+mn-ea"/>
-                <a:cs typeface="+mn-cs"/>
-              </a:defRPr>
-            </a:lvl9pPr>
-          </a:lstStyle>
-          <a:p>
-            <a:r>
-              <a:rPr lang="en-US"/>
-              <a:t>PID loop working </a:t>
-            </a:r>
-          </a:p>
-          <a:p>
-            <a:pPr lvl="1"/>
-            <a:r>
-              <a:rPr lang="en-US"/>
-              <a:t>Modeling the motor</a:t>
-            </a:r>
-          </a:p>
-          <a:p>
-            <a:pPr lvl="1"/>
-            <a:r>
-              <a:rPr lang="en-US"/>
-              <a:t>Analyzing </a:t>
-            </a:r>
-          </a:p>
-          <a:p>
-            <a:pPr lvl="1"/>
-            <a:r>
-              <a:rPr lang="en-US"/>
-              <a:t>Control. </a:t>
-            </a:r>
-            <a:endParaRPr lang="en-GB" dirty="0"/>
-          </a:p>
-        </p:txBody>
-      </p:sp>
     </p:spTree>
     <p:extLst>
       <p:ext uri="{BB962C8B-B14F-4D97-AF65-F5344CB8AC3E}">

</xml_diff>

<commit_message>
Add firmware plan power point
</commit_message>
<xml_diff>
--- a/Documentation/Project Management/Firmware plan.pptx
+++ b/Documentation/Project Management/Firmware plan.pptx
@@ -7,6 +7,14 @@
   <p:sldIdLst>
     <p:sldId id="256" r:id="rId2"/>
     <p:sldId id="257" r:id="rId3"/>
+    <p:sldId id="258" r:id="rId4"/>
+    <p:sldId id="260" r:id="rId5"/>
+    <p:sldId id="261" r:id="rId6"/>
+    <p:sldId id="262" r:id="rId7"/>
+    <p:sldId id="263" r:id="rId8"/>
+    <p:sldId id="264" r:id="rId9"/>
+    <p:sldId id="265" r:id="rId10"/>
+    <p:sldId id="266" r:id="rId11"/>
   </p:sldIdLst>
   <p:sldSz cx="12192000" cy="6858000"/>
   <p:notesSz cx="6858000" cy="9144000"/>
@@ -262,7 +270,7 @@
           <a:p>
             <a:fld id="{BA380C68-295D-47D2-8EE1-6EB8C7501970}" type="datetimeFigureOut">
               <a:rPr lang="en-GB" smtClean="0"/>
-              <a:t>24/10/2019</a:t>
+              <a:t>13/11/2019</a:t>
             </a:fld>
             <a:endParaRPr lang="en-GB"/>
           </a:p>
@@ -462,7 +470,7 @@
           <a:p>
             <a:fld id="{BA380C68-295D-47D2-8EE1-6EB8C7501970}" type="datetimeFigureOut">
               <a:rPr lang="en-GB" smtClean="0"/>
-              <a:t>24/10/2019</a:t>
+              <a:t>13/11/2019</a:t>
             </a:fld>
             <a:endParaRPr lang="en-GB"/>
           </a:p>
@@ -672,7 +680,7 @@
           <a:p>
             <a:fld id="{BA380C68-295D-47D2-8EE1-6EB8C7501970}" type="datetimeFigureOut">
               <a:rPr lang="en-GB" smtClean="0"/>
-              <a:t>24/10/2019</a:t>
+              <a:t>13/11/2019</a:t>
             </a:fld>
             <a:endParaRPr lang="en-GB"/>
           </a:p>
@@ -872,7 +880,7 @@
           <a:p>
             <a:fld id="{BA380C68-295D-47D2-8EE1-6EB8C7501970}" type="datetimeFigureOut">
               <a:rPr lang="en-GB" smtClean="0"/>
-              <a:t>24/10/2019</a:t>
+              <a:t>13/11/2019</a:t>
             </a:fld>
             <a:endParaRPr lang="en-GB"/>
           </a:p>
@@ -1148,7 +1156,7 @@
           <a:p>
             <a:fld id="{BA380C68-295D-47D2-8EE1-6EB8C7501970}" type="datetimeFigureOut">
               <a:rPr lang="en-GB" smtClean="0"/>
-              <a:t>24/10/2019</a:t>
+              <a:t>13/11/2019</a:t>
             </a:fld>
             <a:endParaRPr lang="en-GB"/>
           </a:p>
@@ -1416,7 +1424,7 @@
           <a:p>
             <a:fld id="{BA380C68-295D-47D2-8EE1-6EB8C7501970}" type="datetimeFigureOut">
               <a:rPr lang="en-GB" smtClean="0"/>
-              <a:t>24/10/2019</a:t>
+              <a:t>13/11/2019</a:t>
             </a:fld>
             <a:endParaRPr lang="en-GB"/>
           </a:p>
@@ -1831,7 +1839,7 @@
           <a:p>
             <a:fld id="{BA380C68-295D-47D2-8EE1-6EB8C7501970}" type="datetimeFigureOut">
               <a:rPr lang="en-GB" smtClean="0"/>
-              <a:t>24/10/2019</a:t>
+              <a:t>13/11/2019</a:t>
             </a:fld>
             <a:endParaRPr lang="en-GB"/>
           </a:p>
@@ -1973,7 +1981,7 @@
           <a:p>
             <a:fld id="{BA380C68-295D-47D2-8EE1-6EB8C7501970}" type="datetimeFigureOut">
               <a:rPr lang="en-GB" smtClean="0"/>
-              <a:t>24/10/2019</a:t>
+              <a:t>13/11/2019</a:t>
             </a:fld>
             <a:endParaRPr lang="en-GB"/>
           </a:p>
@@ -2086,7 +2094,7 @@
           <a:p>
             <a:fld id="{BA380C68-295D-47D2-8EE1-6EB8C7501970}" type="datetimeFigureOut">
               <a:rPr lang="en-GB" smtClean="0"/>
-              <a:t>24/10/2019</a:t>
+              <a:t>13/11/2019</a:t>
             </a:fld>
             <a:endParaRPr lang="en-GB"/>
           </a:p>
@@ -2399,7 +2407,7 @@
           <a:p>
             <a:fld id="{BA380C68-295D-47D2-8EE1-6EB8C7501970}" type="datetimeFigureOut">
               <a:rPr lang="en-GB" smtClean="0"/>
-              <a:t>24/10/2019</a:t>
+              <a:t>13/11/2019</a:t>
             </a:fld>
             <a:endParaRPr lang="en-GB"/>
           </a:p>
@@ -2688,7 +2696,7 @@
           <a:p>
             <a:fld id="{BA380C68-295D-47D2-8EE1-6EB8C7501970}" type="datetimeFigureOut">
               <a:rPr lang="en-GB" smtClean="0"/>
-              <a:t>24/10/2019</a:t>
+              <a:t>13/11/2019</a:t>
             </a:fld>
             <a:endParaRPr lang="en-GB"/>
           </a:p>
@@ -2931,7 +2939,7 @@
           <a:p>
             <a:fld id="{BA380C68-295D-47D2-8EE1-6EB8C7501970}" type="datetimeFigureOut">
               <a:rPr lang="en-GB" smtClean="0"/>
-              <a:t>24/10/2019</a:t>
+              <a:t>13/11/2019</a:t>
             </a:fld>
             <a:endParaRPr lang="en-GB"/>
           </a:p>
@@ -3415,6 +3423,101 @@
 </p:sld>
 </file>
 
+<file path=ppt/slides/slide10.xml><?xml version="1.0" encoding="utf-8"?>
+<p:sld xmlns:a="http://schemas.openxmlformats.org/drawingml/2006/main" xmlns:r="http://schemas.openxmlformats.org/officeDocument/2006/relationships" xmlns:p="http://schemas.openxmlformats.org/presentationml/2006/main">
+  <p:cSld>
+    <p:spTree>
+      <p:nvGrpSpPr>
+        <p:cNvPr id="1" name=""/>
+        <p:cNvGrpSpPr/>
+        <p:nvPr/>
+      </p:nvGrpSpPr>
+      <p:grpSpPr>
+        <a:xfrm>
+          <a:off x="0" y="0"/>
+          <a:ext cx="0" cy="0"/>
+          <a:chOff x="0" y="0"/>
+          <a:chExt cx="0" cy="0"/>
+        </a:xfrm>
+      </p:grpSpPr>
+      <p:sp>
+        <p:nvSpPr>
+          <p:cNvPr id="2" name="Title 1">
+            <a:extLst>
+              <a:ext uri="{FF2B5EF4-FFF2-40B4-BE49-F238E27FC236}">
+                <a16:creationId xmlns:a16="http://schemas.microsoft.com/office/drawing/2014/main" id="{60770A87-5712-4806-8435-FD419087F947}"/>
+              </a:ext>
+            </a:extLst>
+          </p:cNvPr>
+          <p:cNvSpPr>
+            <a:spLocks noGrp="1"/>
+          </p:cNvSpPr>
+          <p:nvPr>
+            <p:ph type="title"/>
+          </p:nvPr>
+        </p:nvSpPr>
+        <p:spPr/>
+        <p:txBody>
+          <a:bodyPr/>
+          <a:lstStyle/>
+          <a:p>
+            <a:r>
+              <a:rPr lang="en-US" dirty="0"/>
+              <a:t>Closed loop IH LQR</a:t>
+            </a:r>
+            <a:endParaRPr lang="en-GB" dirty="0"/>
+          </a:p>
+        </p:txBody>
+      </p:sp>
+      <p:pic>
+        <p:nvPicPr>
+          <p:cNvPr id="5" name="Picture 4">
+            <a:extLst>
+              <a:ext uri="{FF2B5EF4-FFF2-40B4-BE49-F238E27FC236}">
+                <a16:creationId xmlns:a16="http://schemas.microsoft.com/office/drawing/2014/main" id="{F43FFD8B-AC01-4D5E-8E4B-FA40311CFE02}"/>
+              </a:ext>
+            </a:extLst>
+          </p:cNvPr>
+          <p:cNvPicPr>
+            <a:picLocks noChangeAspect="1"/>
+          </p:cNvPicPr>
+          <p:nvPr/>
+        </p:nvPicPr>
+        <p:blipFill>
+          <a:blip r:embed="rId2">
+            <a:extLst>
+              <a:ext uri="{28A0092B-C50C-407E-A947-70E740481C1C}">
+                <a14:useLocalDpi xmlns:a14="http://schemas.microsoft.com/office/drawing/2010/main" val="0"/>
+              </a:ext>
+            </a:extLst>
+          </a:blip>
+          <a:stretch>
+            <a:fillRect/>
+          </a:stretch>
+        </p:blipFill>
+        <p:spPr>
+          <a:xfrm>
+            <a:off x="2124163" y="1599035"/>
+            <a:ext cx="6666667" cy="5000000"/>
+          </a:xfrm>
+          <a:prstGeom prst="rect">
+            <a:avLst/>
+          </a:prstGeom>
+        </p:spPr>
+      </p:pic>
+    </p:spTree>
+    <p:extLst>
+      <p:ext uri="{BB962C8B-B14F-4D97-AF65-F5344CB8AC3E}">
+        <p14:creationId xmlns:p14="http://schemas.microsoft.com/office/powerpoint/2010/main" val="803864776"/>
+      </p:ext>
+    </p:extLst>
+  </p:cSld>
+  <p:clrMapOvr>
+    <a:masterClrMapping/>
+  </p:clrMapOvr>
+</p:sld>
+</file>
+
 <file path=ppt/slides/slide2.xml><?xml version="1.0" encoding="utf-8"?>
 <p:sld xmlns:a="http://schemas.openxmlformats.org/drawingml/2006/main" xmlns:r="http://schemas.openxmlformats.org/officeDocument/2006/relationships" xmlns:p="http://schemas.openxmlformats.org/presentationml/2006/main">
   <p:cSld>
@@ -3515,6 +3618,1038 @@
     <p:extLst>
       <p:ext uri="{BB962C8B-B14F-4D97-AF65-F5344CB8AC3E}">
         <p14:creationId xmlns:p14="http://schemas.microsoft.com/office/powerpoint/2010/main" val="4082593038"/>
+      </p:ext>
+    </p:extLst>
+  </p:cSld>
+  <p:clrMapOvr>
+    <a:masterClrMapping/>
+  </p:clrMapOvr>
+</p:sld>
+</file>
+
+<file path=ppt/slides/slide3.xml><?xml version="1.0" encoding="utf-8"?>
+<p:sld xmlns:a="http://schemas.openxmlformats.org/drawingml/2006/main" xmlns:r="http://schemas.openxmlformats.org/officeDocument/2006/relationships" xmlns:p="http://schemas.openxmlformats.org/presentationml/2006/main">
+  <p:cSld>
+    <p:spTree>
+      <p:nvGrpSpPr>
+        <p:cNvPr id="1" name=""/>
+        <p:cNvGrpSpPr/>
+        <p:nvPr/>
+      </p:nvGrpSpPr>
+      <p:grpSpPr>
+        <a:xfrm>
+          <a:off x="0" y="0"/>
+          <a:ext cx="0" cy="0"/>
+          <a:chOff x="0" y="0"/>
+          <a:chExt cx="0" cy="0"/>
+        </a:xfrm>
+      </p:grpSpPr>
+      <p:sp>
+        <p:nvSpPr>
+          <p:cNvPr id="2" name="Title 1">
+            <a:extLst>
+              <a:ext uri="{FF2B5EF4-FFF2-40B4-BE49-F238E27FC236}">
+                <a16:creationId xmlns:a16="http://schemas.microsoft.com/office/drawing/2014/main" id="{545D4D1D-75E8-434E-8B04-A2A26D9DB531}"/>
+              </a:ext>
+            </a:extLst>
+          </p:cNvPr>
+          <p:cNvSpPr>
+            <a:spLocks noGrp="1"/>
+          </p:cNvSpPr>
+          <p:nvPr>
+            <p:ph type="title"/>
+          </p:nvPr>
+        </p:nvSpPr>
+        <p:spPr/>
+        <p:txBody>
+          <a:bodyPr/>
+          <a:lstStyle/>
+          <a:p>
+            <a:endParaRPr lang="en-GB"/>
+          </a:p>
+        </p:txBody>
+      </p:sp>
+      <p:sp>
+        <p:nvSpPr>
+          <p:cNvPr id="3" name="Content Placeholder 2">
+            <a:extLst>
+              <a:ext uri="{FF2B5EF4-FFF2-40B4-BE49-F238E27FC236}">
+                <a16:creationId xmlns:a16="http://schemas.microsoft.com/office/drawing/2014/main" id="{63F2B6C1-94CD-4532-8F25-75FC506430B2}"/>
+              </a:ext>
+            </a:extLst>
+          </p:cNvPr>
+          <p:cNvSpPr>
+            <a:spLocks noGrp="1"/>
+          </p:cNvSpPr>
+          <p:nvPr>
+            <p:ph idx="1"/>
+          </p:nvPr>
+        </p:nvSpPr>
+        <p:spPr/>
+        <p:txBody>
+          <a:bodyPr/>
+          <a:lstStyle/>
+          <a:p>
+            <a:endParaRPr lang="en-GB" dirty="0"/>
+          </a:p>
+        </p:txBody>
+      </p:sp>
+      <p:pic>
+        <p:nvPicPr>
+          <p:cNvPr id="4" name="Picture 3">
+            <a:extLst>
+              <a:ext uri="{FF2B5EF4-FFF2-40B4-BE49-F238E27FC236}">
+                <a16:creationId xmlns:a16="http://schemas.microsoft.com/office/drawing/2014/main" id="{C6DC1E2E-AE7E-48FF-A5FC-FC5B0DAE2190}"/>
+              </a:ext>
+            </a:extLst>
+          </p:cNvPr>
+          <p:cNvPicPr>
+            <a:picLocks noChangeAspect="1"/>
+          </p:cNvPicPr>
+          <p:nvPr/>
+        </p:nvPicPr>
+        <p:blipFill rotWithShape="1">
+          <a:blip r:embed="rId2"/>
+          <a:srcRect l="2767" t="7734" r="53908" b="10712"/>
+          <a:stretch/>
+        </p:blipFill>
+        <p:spPr>
+          <a:xfrm>
+            <a:off x="113535" y="1505860"/>
+            <a:ext cx="8371643" cy="4432046"/>
+          </a:xfrm>
+          <a:prstGeom prst="rect">
+            <a:avLst/>
+          </a:prstGeom>
+        </p:spPr>
+      </p:pic>
+      <p:sp>
+        <p:nvSpPr>
+          <p:cNvPr id="5" name="TextBox 4">
+            <a:extLst>
+              <a:ext uri="{FF2B5EF4-FFF2-40B4-BE49-F238E27FC236}">
+                <a16:creationId xmlns:a16="http://schemas.microsoft.com/office/drawing/2014/main" id="{2A7A7B9A-E319-478B-AB09-C05BC6E031F1}"/>
+              </a:ext>
+            </a:extLst>
+          </p:cNvPr>
+          <p:cNvSpPr txBox="1"/>
+          <p:nvPr/>
+        </p:nvSpPr>
+        <p:spPr>
+          <a:xfrm>
+            <a:off x="9376286" y="3981536"/>
+            <a:ext cx="1704313" cy="369332"/>
+          </a:xfrm>
+          <a:prstGeom prst="rect">
+            <a:avLst/>
+          </a:prstGeom>
+          <a:noFill/>
+        </p:spPr>
+        <p:txBody>
+          <a:bodyPr wrap="none" rtlCol="0">
+            <a:spAutoFit/>
+          </a:bodyPr>
+          <a:lstStyle/>
+          <a:p>
+            <a:r>
+              <a:rPr lang="en-US" dirty="0">
+                <a:solidFill>
+                  <a:srgbClr val="FF0000"/>
+                </a:solidFill>
+              </a:rPr>
+              <a:t>Y(t) = A(1  - e</a:t>
+            </a:r>
+            <a:r>
+              <a:rPr lang="en-US" baseline="30000" dirty="0">
+                <a:solidFill>
+                  <a:srgbClr val="FF0000"/>
+                </a:solidFill>
+              </a:rPr>
+              <a:t>-t/T</a:t>
+            </a:r>
+            <a:r>
+              <a:rPr lang="en-US" dirty="0">
+                <a:solidFill>
+                  <a:srgbClr val="FF0000"/>
+                </a:solidFill>
+              </a:rPr>
+              <a:t>)</a:t>
+            </a:r>
+            <a:endParaRPr lang="en-GB" baseline="30000" dirty="0">
+              <a:solidFill>
+                <a:srgbClr val="FF0000"/>
+              </a:solidFill>
+            </a:endParaRPr>
+          </a:p>
+        </p:txBody>
+      </p:sp>
+      <p:pic>
+        <p:nvPicPr>
+          <p:cNvPr id="6" name="Picture 5">
+            <a:extLst>
+              <a:ext uri="{FF2B5EF4-FFF2-40B4-BE49-F238E27FC236}">
+                <a16:creationId xmlns:a16="http://schemas.microsoft.com/office/drawing/2014/main" id="{6393AA8C-5445-4ED2-9B70-EA0CC975238A}"/>
+              </a:ext>
+            </a:extLst>
+          </p:cNvPr>
+          <p:cNvPicPr>
+            <a:picLocks noChangeAspect="1"/>
+          </p:cNvPicPr>
+          <p:nvPr/>
+        </p:nvPicPr>
+        <p:blipFill rotWithShape="1">
+          <a:blip r:embed="rId3"/>
+          <a:srcRect l="22566" t="21112" r="68947" b="61342"/>
+          <a:stretch/>
+        </p:blipFill>
+        <p:spPr>
+          <a:xfrm>
+            <a:off x="8742631" y="1690688"/>
+            <a:ext cx="3200274" cy="1860884"/>
+          </a:xfrm>
+          <a:prstGeom prst="rect">
+            <a:avLst/>
+          </a:prstGeom>
+        </p:spPr>
+      </p:pic>
+      <p:sp>
+        <p:nvSpPr>
+          <p:cNvPr id="7" name="TextBox 6">
+            <a:extLst>
+              <a:ext uri="{FF2B5EF4-FFF2-40B4-BE49-F238E27FC236}">
+                <a16:creationId xmlns:a16="http://schemas.microsoft.com/office/drawing/2014/main" id="{31277643-2B30-4854-AEE6-F5B87ED00B65}"/>
+              </a:ext>
+            </a:extLst>
+          </p:cNvPr>
+          <p:cNvSpPr txBox="1"/>
+          <p:nvPr/>
+        </p:nvSpPr>
+        <p:spPr>
+          <a:xfrm>
+            <a:off x="9376285" y="4982646"/>
+            <a:ext cx="947695" cy="646331"/>
+          </a:xfrm>
+          <a:prstGeom prst="rect">
+            <a:avLst/>
+          </a:prstGeom>
+          <a:noFill/>
+        </p:spPr>
+        <p:txBody>
+          <a:bodyPr wrap="none" rtlCol="0">
+            <a:spAutoFit/>
+          </a:bodyPr>
+          <a:lstStyle/>
+          <a:p>
+            <a:r>
+              <a:rPr lang="en-US" dirty="0">
+                <a:solidFill>
+                  <a:srgbClr val="FF0000"/>
+                </a:solidFill>
+              </a:rPr>
+              <a:t>T =83 </a:t>
+            </a:r>
+          </a:p>
+          <a:p>
+            <a:r>
+              <a:rPr lang="en-US" dirty="0">
+                <a:solidFill>
+                  <a:srgbClr val="FF0000"/>
+                </a:solidFill>
+              </a:rPr>
+              <a:t>A = 1.75</a:t>
+            </a:r>
+          </a:p>
+        </p:txBody>
+      </p:sp>
+    </p:spTree>
+    <p:extLst>
+      <p:ext uri="{BB962C8B-B14F-4D97-AF65-F5344CB8AC3E}">
+        <p14:creationId xmlns:p14="http://schemas.microsoft.com/office/powerpoint/2010/main" val="1972200685"/>
+      </p:ext>
+    </p:extLst>
+  </p:cSld>
+  <p:clrMapOvr>
+    <a:masterClrMapping/>
+  </p:clrMapOvr>
+</p:sld>
+</file>
+
+<file path=ppt/slides/slide4.xml><?xml version="1.0" encoding="utf-8"?>
+<p:sld xmlns:a="http://schemas.openxmlformats.org/drawingml/2006/main" xmlns:r="http://schemas.openxmlformats.org/officeDocument/2006/relationships" xmlns:p="http://schemas.openxmlformats.org/presentationml/2006/main">
+  <p:cSld>
+    <p:spTree>
+      <p:nvGrpSpPr>
+        <p:cNvPr id="1" name=""/>
+        <p:cNvGrpSpPr/>
+        <p:nvPr/>
+      </p:nvGrpSpPr>
+      <p:grpSpPr>
+        <a:xfrm>
+          <a:off x="0" y="0"/>
+          <a:ext cx="0" cy="0"/>
+          <a:chOff x="0" y="0"/>
+          <a:chExt cx="0" cy="0"/>
+        </a:xfrm>
+      </p:grpSpPr>
+      <p:sp>
+        <p:nvSpPr>
+          <p:cNvPr id="2" name="Title 1">
+            <a:extLst>
+              <a:ext uri="{FF2B5EF4-FFF2-40B4-BE49-F238E27FC236}">
+                <a16:creationId xmlns:a16="http://schemas.microsoft.com/office/drawing/2014/main" id="{5A9BC1C0-D241-4AEB-B2D7-2B27449F2290}"/>
+              </a:ext>
+            </a:extLst>
+          </p:cNvPr>
+          <p:cNvSpPr>
+            <a:spLocks noGrp="1"/>
+          </p:cNvSpPr>
+          <p:nvPr>
+            <p:ph type="title"/>
+          </p:nvPr>
+        </p:nvSpPr>
+        <p:spPr/>
+        <p:txBody>
+          <a:bodyPr/>
+          <a:lstStyle/>
+          <a:p>
+            <a:endParaRPr lang="en-GB"/>
+          </a:p>
+        </p:txBody>
+      </p:sp>
+      <p:sp>
+        <p:nvSpPr>
+          <p:cNvPr id="3" name="Content Placeholder 2">
+            <a:extLst>
+              <a:ext uri="{FF2B5EF4-FFF2-40B4-BE49-F238E27FC236}">
+                <a16:creationId xmlns:a16="http://schemas.microsoft.com/office/drawing/2014/main" id="{9ADE8A24-B4DE-47F1-A82F-FA75A9DA8DA7}"/>
+              </a:ext>
+            </a:extLst>
+          </p:cNvPr>
+          <p:cNvSpPr>
+            <a:spLocks noGrp="1"/>
+          </p:cNvSpPr>
+          <p:nvPr>
+            <p:ph idx="1"/>
+          </p:nvPr>
+        </p:nvSpPr>
+        <p:spPr/>
+        <p:txBody>
+          <a:bodyPr/>
+          <a:lstStyle/>
+          <a:p>
+            <a:endParaRPr lang="en-GB" dirty="0"/>
+          </a:p>
+        </p:txBody>
+      </p:sp>
+      <p:pic>
+        <p:nvPicPr>
+          <p:cNvPr id="4" name="Picture 3">
+            <a:extLst>
+              <a:ext uri="{FF2B5EF4-FFF2-40B4-BE49-F238E27FC236}">
+                <a16:creationId xmlns:a16="http://schemas.microsoft.com/office/drawing/2014/main" id="{E035EA9E-30C7-4015-9247-9092F63F402C}"/>
+              </a:ext>
+            </a:extLst>
+          </p:cNvPr>
+          <p:cNvPicPr>
+            <a:picLocks noChangeAspect="1"/>
+          </p:cNvPicPr>
+          <p:nvPr/>
+        </p:nvPicPr>
+        <p:blipFill>
+          <a:blip r:embed="rId2">
+            <a:extLst>
+              <a:ext uri="{28A0092B-C50C-407E-A947-70E740481C1C}">
+                <a14:useLocalDpi xmlns:a14="http://schemas.microsoft.com/office/drawing/2010/main" val="0"/>
+              </a:ext>
+            </a:extLst>
+          </a:blip>
+          <a:stretch>
+            <a:fillRect/>
+          </a:stretch>
+        </p:blipFill>
+        <p:spPr>
+          <a:xfrm>
+            <a:off x="582631" y="456897"/>
+            <a:ext cx="8210550" cy="6157913"/>
+          </a:xfrm>
+          <a:prstGeom prst="rect">
+            <a:avLst/>
+          </a:prstGeom>
+        </p:spPr>
+      </p:pic>
+    </p:spTree>
+    <p:extLst>
+      <p:ext uri="{BB962C8B-B14F-4D97-AF65-F5344CB8AC3E}">
+        <p14:creationId xmlns:p14="http://schemas.microsoft.com/office/powerpoint/2010/main" val="2095823311"/>
+      </p:ext>
+    </p:extLst>
+  </p:cSld>
+  <p:clrMapOvr>
+    <a:masterClrMapping/>
+  </p:clrMapOvr>
+</p:sld>
+</file>
+
+<file path=ppt/slides/slide5.xml><?xml version="1.0" encoding="utf-8"?>
+<p:sld xmlns:a="http://schemas.openxmlformats.org/drawingml/2006/main" xmlns:r="http://schemas.openxmlformats.org/officeDocument/2006/relationships" xmlns:p="http://schemas.openxmlformats.org/presentationml/2006/main">
+  <p:cSld>
+    <p:spTree>
+      <p:nvGrpSpPr>
+        <p:cNvPr id="1" name=""/>
+        <p:cNvGrpSpPr/>
+        <p:nvPr/>
+      </p:nvGrpSpPr>
+      <p:grpSpPr>
+        <a:xfrm>
+          <a:off x="0" y="0"/>
+          <a:ext cx="0" cy="0"/>
+          <a:chOff x="0" y="0"/>
+          <a:chExt cx="0" cy="0"/>
+        </a:xfrm>
+      </p:grpSpPr>
+      <p:sp>
+        <p:nvSpPr>
+          <p:cNvPr id="2" name="Title 1">
+            <a:extLst>
+              <a:ext uri="{FF2B5EF4-FFF2-40B4-BE49-F238E27FC236}">
+                <a16:creationId xmlns:a16="http://schemas.microsoft.com/office/drawing/2014/main" id="{63F7E4C0-E6A2-494F-9B27-F60CA285E5B2}"/>
+              </a:ext>
+            </a:extLst>
+          </p:cNvPr>
+          <p:cNvSpPr>
+            <a:spLocks noGrp="1"/>
+          </p:cNvSpPr>
+          <p:nvPr>
+            <p:ph type="title"/>
+          </p:nvPr>
+        </p:nvSpPr>
+        <p:spPr/>
+        <p:txBody>
+          <a:bodyPr/>
+          <a:lstStyle/>
+          <a:p>
+            <a:endParaRPr lang="en-GB"/>
+          </a:p>
+        </p:txBody>
+      </p:sp>
+      <p:pic>
+        <p:nvPicPr>
+          <p:cNvPr id="2050" name="Picture 2" descr="https://scontent.fbhx2-1.fna.fbcdn.net/v/t1.15752-9/56480324_2289672304639224_1619954027875794944_n.jpg?_nc_cat=106&amp;_nc_ht=scontent.fbhx2-1.fna&amp;oh=2b51f7049d7625f1567109706bd45fe6&amp;oe=5D45C454">
+            <a:extLst>
+              <a:ext uri="{FF2B5EF4-FFF2-40B4-BE49-F238E27FC236}">
+                <a16:creationId xmlns:a16="http://schemas.microsoft.com/office/drawing/2014/main" id="{FA26B331-3EB7-49E7-AAF1-14D37131CD21}"/>
+              </a:ext>
+            </a:extLst>
+          </p:cNvPr>
+          <p:cNvPicPr>
+            <a:picLocks noChangeAspect="1" noChangeArrowheads="1"/>
+          </p:cNvPicPr>
+          <p:nvPr/>
+        </p:nvPicPr>
+        <p:blipFill rotWithShape="1">
+          <a:blip r:embed="rId2">
+            <a:extLst>
+              <a:ext uri="{28A0092B-C50C-407E-A947-70E740481C1C}">
+                <a14:useLocalDpi xmlns:a14="http://schemas.microsoft.com/office/drawing/2010/main" val="0"/>
+              </a:ext>
+            </a:extLst>
+          </a:blip>
+          <a:srcRect l="6145" t="14801" r="1650" b="29297"/>
+          <a:stretch/>
+        </p:blipFill>
+        <p:spPr bwMode="auto">
+          <a:xfrm>
+            <a:off x="3103601" y="180242"/>
+            <a:ext cx="6022644" cy="6491386"/>
+          </a:xfrm>
+          <a:prstGeom prst="rect">
+            <a:avLst/>
+          </a:prstGeom>
+          <a:noFill/>
+          <a:extLst>
+            <a:ext uri="{909E8E84-426E-40DD-AFC4-6F175D3DCCD1}">
+              <a14:hiddenFill xmlns:a14="http://schemas.microsoft.com/office/drawing/2010/main">
+                <a:solidFill>
+                  <a:srgbClr val="FFFFFF"/>
+                </a:solidFill>
+              </a14:hiddenFill>
+            </a:ext>
+          </a:extLst>
+        </p:spPr>
+      </p:pic>
+    </p:spTree>
+    <p:extLst>
+      <p:ext uri="{BB962C8B-B14F-4D97-AF65-F5344CB8AC3E}">
+        <p14:creationId xmlns:p14="http://schemas.microsoft.com/office/powerpoint/2010/main" val="4139548675"/>
+      </p:ext>
+    </p:extLst>
+  </p:cSld>
+  <p:clrMapOvr>
+    <a:masterClrMapping/>
+  </p:clrMapOvr>
+</p:sld>
+</file>
+
+<file path=ppt/slides/slide6.xml><?xml version="1.0" encoding="utf-8"?>
+<p:sld xmlns:a="http://schemas.openxmlformats.org/drawingml/2006/main" xmlns:r="http://schemas.openxmlformats.org/officeDocument/2006/relationships" xmlns:p="http://schemas.openxmlformats.org/presentationml/2006/main">
+  <p:cSld>
+    <p:spTree>
+      <p:nvGrpSpPr>
+        <p:cNvPr id="1" name=""/>
+        <p:cNvGrpSpPr/>
+        <p:nvPr/>
+      </p:nvGrpSpPr>
+      <p:grpSpPr>
+        <a:xfrm>
+          <a:off x="0" y="0"/>
+          <a:ext cx="0" cy="0"/>
+          <a:chOff x="0" y="0"/>
+          <a:chExt cx="0" cy="0"/>
+        </a:xfrm>
+      </p:grpSpPr>
+      <p:sp>
+        <p:nvSpPr>
+          <p:cNvPr id="2" name="Title 1">
+            <a:extLst>
+              <a:ext uri="{FF2B5EF4-FFF2-40B4-BE49-F238E27FC236}">
+                <a16:creationId xmlns:a16="http://schemas.microsoft.com/office/drawing/2014/main" id="{FA3EA478-D700-4F7C-B06E-949C838FD9E8}"/>
+              </a:ext>
+            </a:extLst>
+          </p:cNvPr>
+          <p:cNvSpPr>
+            <a:spLocks noGrp="1"/>
+          </p:cNvSpPr>
+          <p:nvPr>
+            <p:ph type="title"/>
+          </p:nvPr>
+        </p:nvSpPr>
+        <p:spPr/>
+        <p:txBody>
+          <a:bodyPr/>
+          <a:lstStyle/>
+          <a:p>
+            <a:endParaRPr lang="en-GB"/>
+          </a:p>
+        </p:txBody>
+      </p:sp>
+      <p:pic>
+        <p:nvPicPr>
+          <p:cNvPr id="3074" name="Picture 2" descr="Image result for transfer function of a pid controller">
+            <a:extLst>
+              <a:ext uri="{FF2B5EF4-FFF2-40B4-BE49-F238E27FC236}">
+                <a16:creationId xmlns:a16="http://schemas.microsoft.com/office/drawing/2014/main" id="{AD4934DB-D2B4-40B9-9A77-C478AC0F0E38}"/>
+              </a:ext>
+            </a:extLst>
+          </p:cNvPr>
+          <p:cNvPicPr>
+            <a:picLocks noChangeAspect="1" noChangeArrowheads="1"/>
+          </p:cNvPicPr>
+          <p:nvPr/>
+        </p:nvPicPr>
+        <p:blipFill>
+          <a:blip r:embed="rId2">
+            <a:extLst>
+              <a:ext uri="{28A0092B-C50C-407E-A947-70E740481C1C}">
+                <a14:useLocalDpi xmlns:a14="http://schemas.microsoft.com/office/drawing/2010/main" val="0"/>
+              </a:ext>
+            </a:extLst>
+          </a:blip>
+          <a:srcRect/>
+          <a:stretch>
+            <a:fillRect/>
+          </a:stretch>
+        </p:blipFill>
+        <p:spPr bwMode="auto">
+          <a:xfrm>
+            <a:off x="6325562" y="2462212"/>
+            <a:ext cx="4591050" cy="1933575"/>
+          </a:xfrm>
+          <a:prstGeom prst="rect">
+            <a:avLst/>
+          </a:prstGeom>
+          <a:noFill/>
+          <a:extLst>
+            <a:ext uri="{909E8E84-426E-40DD-AFC4-6F175D3DCCD1}">
+              <a14:hiddenFill xmlns:a14="http://schemas.microsoft.com/office/drawing/2010/main">
+                <a:solidFill>
+                  <a:srgbClr val="FFFFFF"/>
+                </a:solidFill>
+              </a14:hiddenFill>
+            </a:ext>
+          </a:extLst>
+        </p:spPr>
+      </p:pic>
+      <p:pic>
+        <p:nvPicPr>
+          <p:cNvPr id="3076" name="Picture 4" descr="https://scontent.fbhx2-1.fna.fbcdn.net/v/t1.15752-9/56608884_272368510308767_5396392434785583104_n.jpg?_nc_cat=109&amp;_nc_ht=scontent.fbhx2-1.fna&amp;oh=7fa7dec0b788ebb26cc86010113320d3&amp;oe=5D04173B">
+            <a:extLst>
+              <a:ext uri="{FF2B5EF4-FFF2-40B4-BE49-F238E27FC236}">
+                <a16:creationId xmlns:a16="http://schemas.microsoft.com/office/drawing/2014/main" id="{3316A3CF-4FDB-4B77-BA0F-57FEF09247FA}"/>
+              </a:ext>
+            </a:extLst>
+          </p:cNvPr>
+          <p:cNvPicPr>
+            <a:picLocks noChangeAspect="1" noChangeArrowheads="1"/>
+          </p:cNvPicPr>
+          <p:nvPr/>
+        </p:nvPicPr>
+        <p:blipFill rotWithShape="1">
+          <a:blip r:embed="rId3">
+            <a:extLst>
+              <a:ext uri="{28A0092B-C50C-407E-A947-70E740481C1C}">
+                <a14:useLocalDpi xmlns:a14="http://schemas.microsoft.com/office/drawing/2010/main" val="0"/>
+              </a:ext>
+            </a:extLst>
+          </a:blip>
+          <a:srcRect l="3317" t="22385" r="4695" b="32599"/>
+          <a:stretch/>
+        </p:blipFill>
+        <p:spPr bwMode="auto">
+          <a:xfrm>
+            <a:off x="1107608" y="2155970"/>
+            <a:ext cx="3548544" cy="3087149"/>
+          </a:xfrm>
+          <a:prstGeom prst="rect">
+            <a:avLst/>
+          </a:prstGeom>
+          <a:noFill/>
+          <a:extLst>
+            <a:ext uri="{909E8E84-426E-40DD-AFC4-6F175D3DCCD1}">
+              <a14:hiddenFill xmlns:a14="http://schemas.microsoft.com/office/drawing/2010/main">
+                <a:solidFill>
+                  <a:srgbClr val="FFFFFF"/>
+                </a:solidFill>
+              </a14:hiddenFill>
+            </a:ext>
+          </a:extLst>
+        </p:spPr>
+      </p:pic>
+    </p:spTree>
+    <p:extLst>
+      <p:ext uri="{BB962C8B-B14F-4D97-AF65-F5344CB8AC3E}">
+        <p14:creationId xmlns:p14="http://schemas.microsoft.com/office/powerpoint/2010/main" val="2326554209"/>
+      </p:ext>
+    </p:extLst>
+  </p:cSld>
+  <p:clrMapOvr>
+    <a:masterClrMapping/>
+  </p:clrMapOvr>
+</p:sld>
+</file>
+
+<file path=ppt/slides/slide7.xml><?xml version="1.0" encoding="utf-8"?>
+<p:sld xmlns:a="http://schemas.openxmlformats.org/drawingml/2006/main" xmlns:r="http://schemas.openxmlformats.org/officeDocument/2006/relationships" xmlns:p="http://schemas.openxmlformats.org/presentationml/2006/main">
+  <p:cSld>
+    <p:spTree>
+      <p:nvGrpSpPr>
+        <p:cNvPr id="1" name=""/>
+        <p:cNvGrpSpPr/>
+        <p:nvPr/>
+      </p:nvGrpSpPr>
+      <p:grpSpPr>
+        <a:xfrm>
+          <a:off x="0" y="0"/>
+          <a:ext cx="0" cy="0"/>
+          <a:chOff x="0" y="0"/>
+          <a:chExt cx="0" cy="0"/>
+        </a:xfrm>
+      </p:grpSpPr>
+      <p:sp>
+        <p:nvSpPr>
+          <p:cNvPr id="2" name="Title 1">
+            <a:extLst>
+              <a:ext uri="{FF2B5EF4-FFF2-40B4-BE49-F238E27FC236}">
+                <a16:creationId xmlns:a16="http://schemas.microsoft.com/office/drawing/2014/main" id="{4555761A-F1CF-413D-8558-805239EA18D4}"/>
+              </a:ext>
+            </a:extLst>
+          </p:cNvPr>
+          <p:cNvSpPr>
+            <a:spLocks noGrp="1"/>
+          </p:cNvSpPr>
+          <p:nvPr>
+            <p:ph type="title"/>
+          </p:nvPr>
+        </p:nvSpPr>
+        <p:spPr/>
+        <p:txBody>
+          <a:bodyPr/>
+          <a:lstStyle/>
+          <a:p>
+            <a:r>
+              <a:rPr lang="en-US" dirty="0"/>
+              <a:t>State space representation?</a:t>
+            </a:r>
+            <a:endParaRPr lang="en-GB" dirty="0"/>
+          </a:p>
+        </p:txBody>
+      </p:sp>
+      <p:pic>
+        <p:nvPicPr>
+          <p:cNvPr id="1026" name="Picture 2" descr="https://scontent.fbhx2-1.fna.fbcdn.net/v/t1.15752-9/60753936_2341096729288710_7202838594103279616_n.jpg?_nc_cat=110&amp;_nc_ht=scontent.fbhx2-1.fna&amp;oh=817aeb8af8efeb2a13e975785e0caf55&amp;oe=5D61D7EB">
+            <a:extLst>
+              <a:ext uri="{FF2B5EF4-FFF2-40B4-BE49-F238E27FC236}">
+                <a16:creationId xmlns:a16="http://schemas.microsoft.com/office/drawing/2014/main" id="{B21DE45A-776B-4BC3-9DF8-FA2904F40632}"/>
+              </a:ext>
+            </a:extLst>
+          </p:cNvPr>
+          <p:cNvPicPr>
+            <a:picLocks noChangeAspect="1" noChangeArrowheads="1"/>
+          </p:cNvPicPr>
+          <p:nvPr/>
+        </p:nvPicPr>
+        <p:blipFill rotWithShape="1">
+          <a:blip r:embed="rId2">
+            <a:extLst>
+              <a:ext uri="{28A0092B-C50C-407E-A947-70E740481C1C}">
+                <a14:useLocalDpi xmlns:a14="http://schemas.microsoft.com/office/drawing/2010/main" val="0"/>
+              </a:ext>
+            </a:extLst>
+          </a:blip>
+          <a:srcRect l="21937" t="22758" r="15943" b="18276"/>
+          <a:stretch/>
+        </p:blipFill>
+        <p:spPr bwMode="auto">
+          <a:xfrm rot="16200000">
+            <a:off x="3687743" y="537414"/>
+            <a:ext cx="4066337" cy="6861942"/>
+          </a:xfrm>
+          <a:prstGeom prst="rect">
+            <a:avLst/>
+          </a:prstGeom>
+          <a:noFill/>
+          <a:extLst>
+            <a:ext uri="{909E8E84-426E-40DD-AFC4-6F175D3DCCD1}">
+              <a14:hiddenFill xmlns:a14="http://schemas.microsoft.com/office/drawing/2010/main">
+                <a:solidFill>
+                  <a:srgbClr val="FFFFFF"/>
+                </a:solidFill>
+              </a14:hiddenFill>
+            </a:ext>
+          </a:extLst>
+        </p:spPr>
+      </p:pic>
+      <p:sp>
+        <p:nvSpPr>
+          <p:cNvPr id="5" name="Rectangle 4">
+            <a:extLst>
+              <a:ext uri="{FF2B5EF4-FFF2-40B4-BE49-F238E27FC236}">
+                <a16:creationId xmlns:a16="http://schemas.microsoft.com/office/drawing/2014/main" id="{254D567E-8CC7-432D-ABD9-C61D075E4756}"/>
+              </a:ext>
+            </a:extLst>
+          </p:cNvPr>
+          <p:cNvSpPr/>
+          <p:nvPr/>
+        </p:nvSpPr>
+        <p:spPr>
+          <a:xfrm>
+            <a:off x="6096000" y="6085518"/>
+            <a:ext cx="6096000" cy="646331"/>
+          </a:xfrm>
+          <a:prstGeom prst="rect">
+            <a:avLst/>
+          </a:prstGeom>
+        </p:spPr>
+        <p:txBody>
+          <a:bodyPr>
+            <a:spAutoFit/>
+          </a:bodyPr>
+          <a:lstStyle/>
+          <a:p>
+            <a:r>
+              <a:rPr lang="en-GB" dirty="0">
+                <a:hlinkClick r:id="rId3"/>
+              </a:rPr>
+              <a:t>http://ctms.engin.umich.edu/CTMS/index.php?example=MotorSpeed&amp;section=SystemModeling</a:t>
+            </a:r>
+            <a:endParaRPr lang="en-GB" dirty="0"/>
+          </a:p>
+        </p:txBody>
+      </p:sp>
+      <p:sp>
+        <p:nvSpPr>
+          <p:cNvPr id="4" name="Rectangle 3">
+            <a:extLst>
+              <a:ext uri="{FF2B5EF4-FFF2-40B4-BE49-F238E27FC236}">
+                <a16:creationId xmlns:a16="http://schemas.microsoft.com/office/drawing/2014/main" id="{C69498B1-3EF9-42A6-B17F-2D4B000555F3}"/>
+              </a:ext>
+            </a:extLst>
+          </p:cNvPr>
+          <p:cNvSpPr/>
+          <p:nvPr/>
+        </p:nvSpPr>
+        <p:spPr>
+          <a:xfrm>
+            <a:off x="6103883" y="41959"/>
+            <a:ext cx="6096000" cy="646331"/>
+          </a:xfrm>
+          <a:prstGeom prst="rect">
+            <a:avLst/>
+          </a:prstGeom>
+        </p:spPr>
+        <p:txBody>
+          <a:bodyPr>
+            <a:spAutoFit/>
+          </a:bodyPr>
+          <a:lstStyle/>
+          <a:p>
+            <a:r>
+              <a:rPr lang="en-GB" dirty="0">
+                <a:hlinkClick r:id="rId4"/>
+              </a:rPr>
+              <a:t>http://ctms.engin.umich.edu/CTMS/index.php?example=MotorPosition&amp;section=ControlStateSpace</a:t>
+            </a:r>
+            <a:endParaRPr lang="en-GB" dirty="0"/>
+          </a:p>
+        </p:txBody>
+      </p:sp>
+    </p:spTree>
+    <p:extLst>
+      <p:ext uri="{BB962C8B-B14F-4D97-AF65-F5344CB8AC3E}">
+        <p14:creationId xmlns:p14="http://schemas.microsoft.com/office/powerpoint/2010/main" val="897361640"/>
+      </p:ext>
+    </p:extLst>
+  </p:cSld>
+  <p:clrMapOvr>
+    <a:masterClrMapping/>
+  </p:clrMapOvr>
+</p:sld>
+</file>
+
+<file path=ppt/slides/slide8.xml><?xml version="1.0" encoding="utf-8"?>
+<p:sld xmlns:a="http://schemas.openxmlformats.org/drawingml/2006/main" xmlns:r="http://schemas.openxmlformats.org/officeDocument/2006/relationships" xmlns:p="http://schemas.openxmlformats.org/presentationml/2006/main">
+  <p:cSld>
+    <p:spTree>
+      <p:nvGrpSpPr>
+        <p:cNvPr id="1" name=""/>
+        <p:cNvGrpSpPr/>
+        <p:nvPr/>
+      </p:nvGrpSpPr>
+      <p:grpSpPr>
+        <a:xfrm>
+          <a:off x="0" y="0"/>
+          <a:ext cx="0" cy="0"/>
+          <a:chOff x="0" y="0"/>
+          <a:chExt cx="0" cy="0"/>
+        </a:xfrm>
+      </p:grpSpPr>
+      <p:sp>
+        <p:nvSpPr>
+          <p:cNvPr id="2" name="Title 1">
+            <a:extLst>
+              <a:ext uri="{FF2B5EF4-FFF2-40B4-BE49-F238E27FC236}">
+                <a16:creationId xmlns:a16="http://schemas.microsoft.com/office/drawing/2014/main" id="{85CA3D0D-7BBE-425D-86FF-D67BDC450500}"/>
+              </a:ext>
+            </a:extLst>
+          </p:cNvPr>
+          <p:cNvSpPr>
+            <a:spLocks noGrp="1"/>
+          </p:cNvSpPr>
+          <p:nvPr>
+            <p:ph type="title"/>
+          </p:nvPr>
+        </p:nvSpPr>
+        <p:spPr/>
+        <p:txBody>
+          <a:bodyPr/>
+          <a:lstStyle/>
+          <a:p>
+            <a:r>
+              <a:rPr lang="en-US" dirty="0"/>
+              <a:t>State space model.</a:t>
+            </a:r>
+            <a:endParaRPr lang="en-GB" dirty="0"/>
+          </a:p>
+        </p:txBody>
+      </p:sp>
+      <p:pic>
+        <p:nvPicPr>
+          <p:cNvPr id="1026" name="Picture 2" descr="https://scontent.fbhx2-1.fna.fbcdn.net/v/t1.15752-9/61711092_422034355016918_7484547290049282048_n.jpg?_nc_cat=103&amp;_nc_ht=scontent.fbhx2-1.fna&amp;oh=434e6916438709331efe647fbe87eff0&amp;oe=5D555B34">
+            <a:extLst>
+              <a:ext uri="{FF2B5EF4-FFF2-40B4-BE49-F238E27FC236}">
+                <a16:creationId xmlns:a16="http://schemas.microsoft.com/office/drawing/2014/main" id="{3A0E1E0B-3D26-4873-9118-9853A26C1880}"/>
+              </a:ext>
+            </a:extLst>
+          </p:cNvPr>
+          <p:cNvPicPr>
+            <a:picLocks noChangeAspect="1" noChangeArrowheads="1"/>
+          </p:cNvPicPr>
+          <p:nvPr/>
+        </p:nvPicPr>
+        <p:blipFill rotWithShape="1">
+          <a:blip r:embed="rId2">
+            <a:extLst>
+              <a:ext uri="{28A0092B-C50C-407E-A947-70E740481C1C}">
+                <a14:useLocalDpi xmlns:a14="http://schemas.microsoft.com/office/drawing/2010/main" val="0"/>
+              </a:ext>
+            </a:extLst>
+          </a:blip>
+          <a:srcRect l="8655" t="2874" r="35355" b="59769"/>
+          <a:stretch/>
+        </p:blipFill>
+        <p:spPr bwMode="auto">
+          <a:xfrm>
+            <a:off x="1142999" y="2282819"/>
+            <a:ext cx="3633953" cy="4310346"/>
+          </a:xfrm>
+          <a:prstGeom prst="rect">
+            <a:avLst/>
+          </a:prstGeom>
+          <a:noFill/>
+          <a:extLst>
+            <a:ext uri="{909E8E84-426E-40DD-AFC4-6F175D3DCCD1}">
+              <a14:hiddenFill xmlns:a14="http://schemas.microsoft.com/office/drawing/2010/main">
+                <a:solidFill>
+                  <a:srgbClr val="FFFFFF"/>
+                </a:solidFill>
+              </a14:hiddenFill>
+            </a:ext>
+          </a:extLst>
+        </p:spPr>
+      </p:pic>
+      <p:pic>
+        <p:nvPicPr>
+          <p:cNvPr id="5" name="Picture 2" descr="https://scontent.fbhx2-1.fna.fbcdn.net/v/t1.15752-9/61711092_422034355016918_7484547290049282048_n.jpg?_nc_cat=103&amp;_nc_ht=scontent.fbhx2-1.fna&amp;oh=434e6916438709331efe647fbe87eff0&amp;oe=5D555B34">
+            <a:extLst>
+              <a:ext uri="{FF2B5EF4-FFF2-40B4-BE49-F238E27FC236}">
+                <a16:creationId xmlns:a16="http://schemas.microsoft.com/office/drawing/2014/main" id="{04598B10-2B02-4648-A64B-C1AB33FBE08C}"/>
+              </a:ext>
+            </a:extLst>
+          </p:cNvPr>
+          <p:cNvPicPr>
+            <a:picLocks noChangeAspect="1" noChangeArrowheads="1"/>
+          </p:cNvPicPr>
+          <p:nvPr/>
+        </p:nvPicPr>
+        <p:blipFill rotWithShape="1">
+          <a:blip r:embed="rId2">
+            <a:extLst>
+              <a:ext uri="{28A0092B-C50C-407E-A947-70E740481C1C}">
+                <a14:useLocalDpi xmlns:a14="http://schemas.microsoft.com/office/drawing/2010/main" val="0"/>
+              </a:ext>
+            </a:extLst>
+          </a:blip>
+          <a:srcRect l="9881" t="44138" r="3274" b="9885"/>
+          <a:stretch/>
+        </p:blipFill>
+        <p:spPr bwMode="auto">
+          <a:xfrm>
+            <a:off x="5841125" y="2230752"/>
+            <a:ext cx="4635062" cy="4362413"/>
+          </a:xfrm>
+          <a:prstGeom prst="rect">
+            <a:avLst/>
+          </a:prstGeom>
+          <a:noFill/>
+          <a:extLst>
+            <a:ext uri="{909E8E84-426E-40DD-AFC4-6F175D3DCCD1}">
+              <a14:hiddenFill xmlns:a14="http://schemas.microsoft.com/office/drawing/2010/main">
+                <a:solidFill>
+                  <a:srgbClr val="FFFFFF"/>
+                </a:solidFill>
+              </a14:hiddenFill>
+            </a:ext>
+          </a:extLst>
+        </p:spPr>
+      </p:pic>
+    </p:spTree>
+    <p:extLst>
+      <p:ext uri="{BB962C8B-B14F-4D97-AF65-F5344CB8AC3E}">
+        <p14:creationId xmlns:p14="http://schemas.microsoft.com/office/powerpoint/2010/main" val="4206545505"/>
+      </p:ext>
+    </p:extLst>
+  </p:cSld>
+  <p:clrMapOvr>
+    <a:masterClrMapping/>
+  </p:clrMapOvr>
+</p:sld>
+</file>
+
+<file path=ppt/slides/slide9.xml><?xml version="1.0" encoding="utf-8"?>
+<p:sld xmlns:a="http://schemas.openxmlformats.org/drawingml/2006/main" xmlns:r="http://schemas.openxmlformats.org/officeDocument/2006/relationships" xmlns:p="http://schemas.openxmlformats.org/presentationml/2006/main">
+  <p:cSld>
+    <p:spTree>
+      <p:nvGrpSpPr>
+        <p:cNvPr id="1" name=""/>
+        <p:cNvGrpSpPr/>
+        <p:nvPr/>
+      </p:nvGrpSpPr>
+      <p:grpSpPr>
+        <a:xfrm>
+          <a:off x="0" y="0"/>
+          <a:ext cx="0" cy="0"/>
+          <a:chOff x="0" y="0"/>
+          <a:chExt cx="0" cy="0"/>
+        </a:xfrm>
+      </p:grpSpPr>
+      <p:sp>
+        <p:nvSpPr>
+          <p:cNvPr id="2" name="Title 1">
+            <a:extLst>
+              <a:ext uri="{FF2B5EF4-FFF2-40B4-BE49-F238E27FC236}">
+                <a16:creationId xmlns:a16="http://schemas.microsoft.com/office/drawing/2014/main" id="{6F491914-A653-4404-BDF8-AFD165BF4EE3}"/>
+              </a:ext>
+            </a:extLst>
+          </p:cNvPr>
+          <p:cNvSpPr>
+            <a:spLocks noGrp="1"/>
+          </p:cNvSpPr>
+          <p:nvPr>
+            <p:ph type="title"/>
+          </p:nvPr>
+        </p:nvSpPr>
+        <p:spPr/>
+        <p:txBody>
+          <a:bodyPr/>
+          <a:lstStyle/>
+          <a:p>
+            <a:r>
+              <a:rPr lang="en-US" dirty="0"/>
+              <a:t>Open loop step response</a:t>
+            </a:r>
+            <a:endParaRPr lang="en-GB" dirty="0"/>
+          </a:p>
+        </p:txBody>
+      </p:sp>
+      <p:pic>
+        <p:nvPicPr>
+          <p:cNvPr id="5" name="Picture 4">
+            <a:extLst>
+              <a:ext uri="{FF2B5EF4-FFF2-40B4-BE49-F238E27FC236}">
+                <a16:creationId xmlns:a16="http://schemas.microsoft.com/office/drawing/2014/main" id="{CC98B8A9-AD77-4B58-9D9F-BF406E9C55B8}"/>
+              </a:ext>
+            </a:extLst>
+          </p:cNvPr>
+          <p:cNvPicPr>
+            <a:picLocks noChangeAspect="1"/>
+          </p:cNvPicPr>
+          <p:nvPr/>
+        </p:nvPicPr>
+        <p:blipFill>
+          <a:blip r:embed="rId2">
+            <a:extLst>
+              <a:ext uri="{28A0092B-C50C-407E-A947-70E740481C1C}">
+                <a14:useLocalDpi xmlns:a14="http://schemas.microsoft.com/office/drawing/2010/main" val="0"/>
+              </a:ext>
+            </a:extLst>
+          </a:blip>
+          <a:stretch>
+            <a:fillRect/>
+          </a:stretch>
+        </p:blipFill>
+        <p:spPr>
+          <a:xfrm>
+            <a:off x="2179342" y="1690688"/>
+            <a:ext cx="6666667" cy="5000000"/>
+          </a:xfrm>
+          <a:prstGeom prst="rect">
+            <a:avLst/>
+          </a:prstGeom>
+        </p:spPr>
+      </p:pic>
+    </p:spTree>
+    <p:extLst>
+      <p:ext uri="{BB962C8B-B14F-4D97-AF65-F5344CB8AC3E}">
+        <p14:creationId xmlns:p14="http://schemas.microsoft.com/office/powerpoint/2010/main" val="2217617820"/>
       </p:ext>
     </p:extLst>
   </p:cSld>

</xml_diff>